<commit_message>
update slides, fix managed config
</commit_message>
<xml_diff>
--- a/doc/sdc_SeamArquillian.pptx
+++ b/doc/sdc_SeamArquillian.pptx
@@ -295,7 +295,7 @@
           </a:ln>
           <a:extLst>
             <a:ext uri="{909E8E84-426E-40DD-AFC4-6F175D3DCCD1}">
-              <a14:hiddenFill xmlns:a14="http://schemas.microsoft.com/office/drawing/2010/main" xmlns="">
+              <a14:hiddenFill xmlns="" xmlns:a14="http://schemas.microsoft.com/office/drawing/2010/main">
                 <a:solidFill>
                   <a:srgbClr val="FFFFFF"/>
                 </a:solidFill>
@@ -469,7 +469,7 @@
     </p:spTree>
     <p:extLst>
       <p:ext uri="{BB962C8B-B14F-4D97-AF65-F5344CB8AC3E}">
-        <p14:creationId xmlns:p14="http://schemas.microsoft.com/office/powerpoint/2010/main" xmlns="" val="2567890474"/>
+        <p14:creationId xmlns="" xmlns:p14="http://schemas.microsoft.com/office/powerpoint/2010/main" val="2567890474"/>
       </p:ext>
     </p:extLst>
   </p:cSld>
@@ -648,7 +648,7 @@
           </a:ln>
           <a:extLst>
             <a:ext uri="{91240B29-F687-4F45-9708-019B960494DF}">
-              <a14:hiddenLine xmlns:a14="http://schemas.microsoft.com/office/drawing/2010/main" xmlns="" w="9525">
+              <a14:hiddenLine xmlns="" xmlns:a14="http://schemas.microsoft.com/office/drawing/2010/main" w="9525">
                 <a:solidFill>
                   <a:srgbClr val="000000"/>
                 </a:solidFill>
@@ -684,7 +684,7 @@
           </a:xfrm>
           <a:extLst>
             <a:ext uri="{91240B29-F687-4F45-9708-019B960494DF}">
-              <a14:hiddenLine xmlns:a14="http://schemas.microsoft.com/office/drawing/2010/main" xmlns="" w="9525" algn="ctr">
+              <a14:hiddenLine xmlns="" xmlns:a14="http://schemas.microsoft.com/office/drawing/2010/main" w="9525" algn="ctr">
                 <a:solidFill>
                   <a:srgbClr val="000000"/>
                 </a:solidFill>
@@ -694,7 +694,7 @@
               </a14:hiddenLine>
             </a:ext>
             <a:ext uri="{AF507438-7753-43E0-B8FC-AC1667EBCBE1}">
-              <a14:hiddenEffects xmlns:a14="http://schemas.microsoft.com/office/drawing/2010/main" xmlns="">
+              <a14:hiddenEffects xmlns="" xmlns:a14="http://schemas.microsoft.com/office/drawing/2010/main">
                 <a:effectLst>
                   <a:outerShdw dist="35921" dir="2700000" algn="ctr" rotWithShape="0">
                     <a:srgbClr val="808080"/>
@@ -740,7 +740,7 @@
           </a:xfrm>
           <a:extLst>
             <a:ext uri="{91240B29-F687-4F45-9708-019B960494DF}">
-              <a14:hiddenLine xmlns:a14="http://schemas.microsoft.com/office/drawing/2010/main" xmlns="" w="9525" algn="ctr">
+              <a14:hiddenLine xmlns="" xmlns:a14="http://schemas.microsoft.com/office/drawing/2010/main" w="9525" algn="ctr">
                 <a:solidFill>
                   <a:srgbClr val="000000"/>
                 </a:solidFill>
@@ -750,7 +750,7 @@
               </a14:hiddenLine>
             </a:ext>
             <a:ext uri="{AF507438-7753-43E0-B8FC-AC1667EBCBE1}">
-              <a14:hiddenEffects xmlns:a14="http://schemas.microsoft.com/office/drawing/2010/main" xmlns="">
+              <a14:hiddenEffects xmlns="" xmlns:a14="http://schemas.microsoft.com/office/drawing/2010/main">
                 <a:effectLst>
                   <a:outerShdw dist="35921" dir="2700000" algn="ctr" rotWithShape="0">
                     <a:srgbClr val="808080"/>
@@ -790,7 +790,7 @@
           <a:blip r:embed="rId2" cstate="print">
             <a:extLst>
               <a:ext uri="{28A0092B-C50C-407E-A947-70E740481C1C}">
-                <a14:useLocalDpi xmlns:a14="http://schemas.microsoft.com/office/drawing/2010/main" xmlns="" val="0"/>
+                <a14:useLocalDpi xmlns="" xmlns:a14="http://schemas.microsoft.com/office/drawing/2010/main" val="0"/>
               </a:ext>
             </a:extLst>
           </a:blip>
@@ -813,14 +813,14 @@
           </a:ln>
           <a:extLst>
             <a:ext uri="{909E8E84-426E-40DD-AFC4-6F175D3DCCD1}">
-              <a14:hiddenFill xmlns:a14="http://schemas.microsoft.com/office/drawing/2010/main" xmlns="">
+              <a14:hiddenFill xmlns="" xmlns:a14="http://schemas.microsoft.com/office/drawing/2010/main">
                 <a:solidFill>
                   <a:srgbClr val="FFFFFF"/>
                 </a:solidFill>
               </a14:hiddenFill>
             </a:ext>
             <a:ext uri="{91240B29-F687-4F45-9708-019B960494DF}">
-              <a14:hiddenLine xmlns:a14="http://schemas.microsoft.com/office/drawing/2010/main" xmlns="" w="9525">
+              <a14:hiddenLine xmlns="" xmlns:a14="http://schemas.microsoft.com/office/drawing/2010/main" w="9525">
                 <a:solidFill>
                   <a:srgbClr val="000000"/>
                 </a:solidFill>
@@ -885,7 +885,7 @@
             <a:effectLst/>
             <a:extLst>
               <a:ext uri="{91240B29-F687-4F45-9708-019B960494DF}">
-                <a14:hiddenLine xmlns:a14="http://schemas.microsoft.com/office/drawing/2010/main" xmlns="" w="9525">
+                <a14:hiddenLine xmlns="" xmlns:a14="http://schemas.microsoft.com/office/drawing/2010/main" w="9525">
                   <a:solidFill>
                     <a:schemeClr val="tx1"/>
                   </a:solidFill>
@@ -895,7 +895,7 @@
                 </a14:hiddenLine>
               </a:ext>
               <a:ext uri="{AF507438-7753-43E0-B8FC-AC1667EBCBE1}">
-                <a14:hiddenEffects xmlns:a14="http://schemas.microsoft.com/office/drawing/2010/main" xmlns="">
+                <a14:hiddenEffects xmlns="" xmlns:a14="http://schemas.microsoft.com/office/drawing/2010/main">
                   <a:effectLst>
                     <a:outerShdw dist="35921" dir="2700000" algn="ctr" rotWithShape="0">
                       <a:schemeClr val="bg2"/>
@@ -987,7 +987,7 @@
             <a:effectLst/>
             <a:extLst>
               <a:ext uri="{91240B29-F687-4F45-9708-019B960494DF}">
-                <a14:hiddenLine xmlns:a14="http://schemas.microsoft.com/office/drawing/2010/main" xmlns="" w="9525">
+                <a14:hiddenLine xmlns="" xmlns:a14="http://schemas.microsoft.com/office/drawing/2010/main" w="9525">
                   <a:solidFill>
                     <a:schemeClr val="tx1"/>
                   </a:solidFill>
@@ -997,7 +997,7 @@
                 </a14:hiddenLine>
               </a:ext>
               <a:ext uri="{AF507438-7753-43E0-B8FC-AC1667EBCBE1}">
-                <a14:hiddenEffects xmlns:a14="http://schemas.microsoft.com/office/drawing/2010/main" xmlns="">
+                <a14:hiddenEffects xmlns="" xmlns:a14="http://schemas.microsoft.com/office/drawing/2010/main">
                   <a:effectLst>
                     <a:outerShdw dist="35921" dir="2700000" algn="ctr" rotWithShape="0">
                       <a:schemeClr val="bg2"/>
@@ -1089,7 +1089,7 @@
             <a:effectLst/>
             <a:extLst>
               <a:ext uri="{91240B29-F687-4F45-9708-019B960494DF}">
-                <a14:hiddenLine xmlns:a14="http://schemas.microsoft.com/office/drawing/2010/main" xmlns="" w="9525">
+                <a14:hiddenLine xmlns="" xmlns:a14="http://schemas.microsoft.com/office/drawing/2010/main" w="9525">
                   <a:solidFill>
                     <a:schemeClr val="tx1"/>
                   </a:solidFill>
@@ -1099,7 +1099,7 @@
                 </a14:hiddenLine>
               </a:ext>
               <a:ext uri="{AF507438-7753-43E0-B8FC-AC1667EBCBE1}">
-                <a14:hiddenEffects xmlns:a14="http://schemas.microsoft.com/office/drawing/2010/main" xmlns="">
+                <a14:hiddenEffects xmlns="" xmlns:a14="http://schemas.microsoft.com/office/drawing/2010/main">
                   <a:effectLst>
                     <a:outerShdw dist="35921" dir="2700000" algn="ctr" rotWithShape="0">
                       <a:schemeClr val="bg2"/>
@@ -1191,7 +1191,7 @@
             <a:effectLst/>
             <a:extLst>
               <a:ext uri="{91240B29-F687-4F45-9708-019B960494DF}">
-                <a14:hiddenLine xmlns:a14="http://schemas.microsoft.com/office/drawing/2010/main" xmlns="" w="9525">
+                <a14:hiddenLine xmlns="" xmlns:a14="http://schemas.microsoft.com/office/drawing/2010/main" w="9525">
                   <a:solidFill>
                     <a:schemeClr val="tx1"/>
                   </a:solidFill>
@@ -1201,7 +1201,7 @@
                 </a14:hiddenLine>
               </a:ext>
               <a:ext uri="{AF507438-7753-43E0-B8FC-AC1667EBCBE1}">
-                <a14:hiddenEffects xmlns:a14="http://schemas.microsoft.com/office/drawing/2010/main" xmlns="">
+                <a14:hiddenEffects xmlns="" xmlns:a14="http://schemas.microsoft.com/office/drawing/2010/main">
                   <a:effectLst>
                     <a:outerShdw dist="35921" dir="2700000" algn="ctr" rotWithShape="0">
                       <a:schemeClr val="bg2"/>
@@ -1293,7 +1293,7 @@
             <a:effectLst/>
             <a:extLst>
               <a:ext uri="{91240B29-F687-4F45-9708-019B960494DF}">
-                <a14:hiddenLine xmlns:a14="http://schemas.microsoft.com/office/drawing/2010/main" xmlns="" w="9525">
+                <a14:hiddenLine xmlns="" xmlns:a14="http://schemas.microsoft.com/office/drawing/2010/main" w="9525">
                   <a:solidFill>
                     <a:schemeClr val="tx1"/>
                   </a:solidFill>
@@ -1303,7 +1303,7 @@
                 </a14:hiddenLine>
               </a:ext>
               <a:ext uri="{AF507438-7753-43E0-B8FC-AC1667EBCBE1}">
-                <a14:hiddenEffects xmlns:a14="http://schemas.microsoft.com/office/drawing/2010/main" xmlns="">
+                <a14:hiddenEffects xmlns="" xmlns:a14="http://schemas.microsoft.com/office/drawing/2010/main">
                   <a:effectLst>
                     <a:outerShdw dist="35921" dir="2700000" algn="ctr" rotWithShape="0">
                       <a:schemeClr val="bg2"/>
@@ -1396,7 +1396,7 @@
             <a:effectLst/>
             <a:extLst>
               <a:ext uri="{91240B29-F687-4F45-9708-019B960494DF}">
-                <a14:hiddenLine xmlns:a14="http://schemas.microsoft.com/office/drawing/2010/main" xmlns="" w="9525">
+                <a14:hiddenLine xmlns="" xmlns:a14="http://schemas.microsoft.com/office/drawing/2010/main" w="9525">
                   <a:solidFill>
                     <a:schemeClr val="tx1"/>
                   </a:solidFill>
@@ -1406,7 +1406,7 @@
                 </a14:hiddenLine>
               </a:ext>
               <a:ext uri="{AF507438-7753-43E0-B8FC-AC1667EBCBE1}">
-                <a14:hiddenEffects xmlns:a14="http://schemas.microsoft.com/office/drawing/2010/main" xmlns="">
+                <a14:hiddenEffects xmlns="" xmlns:a14="http://schemas.microsoft.com/office/drawing/2010/main">
                   <a:effectLst>
                     <a:outerShdw dist="35921" dir="2700000" algn="ctr" rotWithShape="0">
                       <a:schemeClr val="bg2"/>
@@ -1990,7 +1990,7 @@
     </p:spTree>
     <p:extLst>
       <p:ext uri="{BB962C8B-B14F-4D97-AF65-F5344CB8AC3E}">
-        <p14:creationId xmlns:p14="http://schemas.microsoft.com/office/powerpoint/2010/main" xmlns="" val="4188007517"/>
+        <p14:creationId xmlns="" xmlns:p14="http://schemas.microsoft.com/office/powerpoint/2010/main" val="4188007517"/>
       </p:ext>
     </p:extLst>
   </p:cSld>
@@ -2050,7 +2050,7 @@
           </a:ln>
           <a:extLst>
             <a:ext uri="{91240B29-F687-4F45-9708-019B960494DF}">
-              <a14:hiddenLine xmlns:a14="http://schemas.microsoft.com/office/drawing/2010/main" xmlns="" w="9525" algn="ctr">
+              <a14:hiddenLine xmlns="" xmlns:a14="http://schemas.microsoft.com/office/drawing/2010/main" w="9525" algn="ctr">
                 <a:solidFill>
                   <a:srgbClr val="000000"/>
                 </a:solidFill>
@@ -2145,14 +2145,14 @@
           </a:ln>
           <a:extLst>
             <a:ext uri="{909E8E84-426E-40DD-AFC4-6F175D3DCCD1}">
-              <a14:hiddenFill xmlns:a14="http://schemas.microsoft.com/office/drawing/2010/main" xmlns="">
+              <a14:hiddenFill xmlns="" xmlns:a14="http://schemas.microsoft.com/office/drawing/2010/main">
                 <a:solidFill>
                   <a:srgbClr val="FFFFFF"/>
                 </a:solidFill>
               </a14:hiddenFill>
             </a:ext>
             <a:ext uri="{91240B29-F687-4F45-9708-019B960494DF}">
-              <a14:hiddenLine xmlns:a14="http://schemas.microsoft.com/office/drawing/2010/main" xmlns="" w="9525">
+              <a14:hiddenLine xmlns="" xmlns:a14="http://schemas.microsoft.com/office/drawing/2010/main" w="9525">
                 <a:solidFill>
                   <a:srgbClr val="000000"/>
                 </a:solidFill>
@@ -2203,14 +2203,14 @@
           </a:ln>
           <a:extLst>
             <a:ext uri="{909E8E84-426E-40DD-AFC4-6F175D3DCCD1}">
-              <a14:hiddenFill xmlns:a14="http://schemas.microsoft.com/office/drawing/2010/main" xmlns="">
+              <a14:hiddenFill xmlns="" xmlns:a14="http://schemas.microsoft.com/office/drawing/2010/main">
                 <a:solidFill>
                   <a:srgbClr val="FFFFFF"/>
                 </a:solidFill>
               </a14:hiddenFill>
             </a:ext>
             <a:ext uri="{91240B29-F687-4F45-9708-019B960494DF}">
-              <a14:hiddenLine xmlns:a14="http://schemas.microsoft.com/office/drawing/2010/main" xmlns="" w="9525">
+              <a14:hiddenLine xmlns="" xmlns:a14="http://schemas.microsoft.com/office/drawing/2010/main" w="9525">
                 <a:solidFill>
                   <a:srgbClr val="000000"/>
                 </a:solidFill>
@@ -2638,7 +2638,7 @@
           <a:blip r:embed="rId4" cstate="print">
             <a:extLst>
               <a:ext uri="{28A0092B-C50C-407E-A947-70E740481C1C}">
-                <a14:useLocalDpi xmlns:a14="http://schemas.microsoft.com/office/drawing/2010/main" xmlns="" val="0"/>
+                <a14:useLocalDpi xmlns="" xmlns:a14="http://schemas.microsoft.com/office/drawing/2010/main" val="0"/>
               </a:ext>
             </a:extLst>
           </a:blip>
@@ -2661,14 +2661,14 @@
           </a:ln>
           <a:extLst>
             <a:ext uri="{909E8E84-426E-40DD-AFC4-6F175D3DCCD1}">
-              <a14:hiddenFill xmlns:a14="http://schemas.microsoft.com/office/drawing/2010/main" xmlns="">
+              <a14:hiddenFill xmlns="" xmlns:a14="http://schemas.microsoft.com/office/drawing/2010/main">
                 <a:solidFill>
                   <a:srgbClr val="FFFFFF"/>
                 </a:solidFill>
               </a14:hiddenFill>
             </a:ext>
             <a:ext uri="{91240B29-F687-4F45-9708-019B960494DF}">
-              <a14:hiddenLine xmlns:a14="http://schemas.microsoft.com/office/drawing/2010/main" xmlns="" w="9525">
+              <a14:hiddenLine xmlns="" xmlns:a14="http://schemas.microsoft.com/office/drawing/2010/main" w="9525">
                 <a:solidFill>
                   <a:srgbClr val="000000"/>
                 </a:solidFill>
@@ -2733,7 +2733,7 @@
             <a:effectLst/>
             <a:extLst>
               <a:ext uri="{91240B29-F687-4F45-9708-019B960494DF}">
-                <a14:hiddenLine xmlns:a14="http://schemas.microsoft.com/office/drawing/2010/main" xmlns="" w="9525">
+                <a14:hiddenLine xmlns="" xmlns:a14="http://schemas.microsoft.com/office/drawing/2010/main" w="9525">
                   <a:solidFill>
                     <a:schemeClr val="tx1"/>
                   </a:solidFill>
@@ -2743,7 +2743,7 @@
                 </a14:hiddenLine>
               </a:ext>
               <a:ext uri="{AF507438-7753-43E0-B8FC-AC1667EBCBE1}">
-                <a14:hiddenEffects xmlns:a14="http://schemas.microsoft.com/office/drawing/2010/main" xmlns="">
+                <a14:hiddenEffects xmlns="" xmlns:a14="http://schemas.microsoft.com/office/drawing/2010/main">
                   <a:effectLst>
                     <a:outerShdw dist="35921" dir="2700000" algn="ctr" rotWithShape="0">
                       <a:schemeClr val="bg2"/>
@@ -2835,7 +2835,7 @@
             <a:effectLst/>
             <a:extLst>
               <a:ext uri="{91240B29-F687-4F45-9708-019B960494DF}">
-                <a14:hiddenLine xmlns:a14="http://schemas.microsoft.com/office/drawing/2010/main" xmlns="" w="9525">
+                <a14:hiddenLine xmlns="" xmlns:a14="http://schemas.microsoft.com/office/drawing/2010/main" w="9525">
                   <a:solidFill>
                     <a:schemeClr val="tx1"/>
                   </a:solidFill>
@@ -2845,7 +2845,7 @@
                 </a14:hiddenLine>
               </a:ext>
               <a:ext uri="{AF507438-7753-43E0-B8FC-AC1667EBCBE1}">
-                <a14:hiddenEffects xmlns:a14="http://schemas.microsoft.com/office/drawing/2010/main" xmlns="">
+                <a14:hiddenEffects xmlns="" xmlns:a14="http://schemas.microsoft.com/office/drawing/2010/main">
                   <a:effectLst>
                     <a:outerShdw dist="35921" dir="2700000" algn="ctr" rotWithShape="0">
                       <a:schemeClr val="bg2"/>
@@ -2937,7 +2937,7 @@
             <a:effectLst/>
             <a:extLst>
               <a:ext uri="{91240B29-F687-4F45-9708-019B960494DF}">
-                <a14:hiddenLine xmlns:a14="http://schemas.microsoft.com/office/drawing/2010/main" xmlns="" w="9525">
+                <a14:hiddenLine xmlns="" xmlns:a14="http://schemas.microsoft.com/office/drawing/2010/main" w="9525">
                   <a:solidFill>
                     <a:schemeClr val="tx1"/>
                   </a:solidFill>
@@ -2947,7 +2947,7 @@
                 </a14:hiddenLine>
               </a:ext>
               <a:ext uri="{AF507438-7753-43E0-B8FC-AC1667EBCBE1}">
-                <a14:hiddenEffects xmlns:a14="http://schemas.microsoft.com/office/drawing/2010/main" xmlns="">
+                <a14:hiddenEffects xmlns="" xmlns:a14="http://schemas.microsoft.com/office/drawing/2010/main">
                   <a:effectLst>
                     <a:outerShdw dist="35921" dir="2700000" algn="ctr" rotWithShape="0">
                       <a:schemeClr val="bg2"/>
@@ -3039,7 +3039,7 @@
             <a:effectLst/>
             <a:extLst>
               <a:ext uri="{91240B29-F687-4F45-9708-019B960494DF}">
-                <a14:hiddenLine xmlns:a14="http://schemas.microsoft.com/office/drawing/2010/main" xmlns="" w="9525">
+                <a14:hiddenLine xmlns="" xmlns:a14="http://schemas.microsoft.com/office/drawing/2010/main" w="9525">
                   <a:solidFill>
                     <a:schemeClr val="tx1"/>
                   </a:solidFill>
@@ -3049,7 +3049,7 @@
                 </a14:hiddenLine>
               </a:ext>
               <a:ext uri="{AF507438-7753-43E0-B8FC-AC1667EBCBE1}">
-                <a14:hiddenEffects xmlns:a14="http://schemas.microsoft.com/office/drawing/2010/main" xmlns="">
+                <a14:hiddenEffects xmlns="" xmlns:a14="http://schemas.microsoft.com/office/drawing/2010/main">
                   <a:effectLst>
                     <a:outerShdw dist="35921" dir="2700000" algn="ctr" rotWithShape="0">
                       <a:schemeClr val="bg2"/>
@@ -3141,7 +3141,7 @@
             <a:effectLst/>
             <a:extLst>
               <a:ext uri="{91240B29-F687-4F45-9708-019B960494DF}">
-                <a14:hiddenLine xmlns:a14="http://schemas.microsoft.com/office/drawing/2010/main" xmlns="" w="9525">
+                <a14:hiddenLine xmlns="" xmlns:a14="http://schemas.microsoft.com/office/drawing/2010/main" w="9525">
                   <a:solidFill>
                     <a:schemeClr val="tx1"/>
                   </a:solidFill>
@@ -3151,7 +3151,7 @@
                 </a14:hiddenLine>
               </a:ext>
               <a:ext uri="{AF507438-7753-43E0-B8FC-AC1667EBCBE1}">
-                <a14:hiddenEffects xmlns:a14="http://schemas.microsoft.com/office/drawing/2010/main" xmlns="">
+                <a14:hiddenEffects xmlns="" xmlns:a14="http://schemas.microsoft.com/office/drawing/2010/main">
                   <a:effectLst>
                     <a:outerShdw dist="35921" dir="2700000" algn="ctr" rotWithShape="0">
                       <a:schemeClr val="bg2"/>
@@ -3244,7 +3244,7 @@
             <a:effectLst/>
             <a:extLst>
               <a:ext uri="{91240B29-F687-4F45-9708-019B960494DF}">
-                <a14:hiddenLine xmlns:a14="http://schemas.microsoft.com/office/drawing/2010/main" xmlns="" w="9525">
+                <a14:hiddenLine xmlns="" xmlns:a14="http://schemas.microsoft.com/office/drawing/2010/main" w="9525">
                   <a:solidFill>
                     <a:schemeClr val="tx1"/>
                   </a:solidFill>
@@ -3254,7 +3254,7 @@
                 </a14:hiddenLine>
               </a:ext>
               <a:ext uri="{AF507438-7753-43E0-B8FC-AC1667EBCBE1}">
-                <a14:hiddenEffects xmlns:a14="http://schemas.microsoft.com/office/drawing/2010/main" xmlns="">
+                <a14:hiddenEffects xmlns="" xmlns:a14="http://schemas.microsoft.com/office/drawing/2010/main">
                   <a:effectLst>
                     <a:outerShdw dist="35921" dir="2700000" algn="ctr" rotWithShape="0">
                       <a:schemeClr val="bg2"/>
@@ -4878,13 +4878,8 @@
               </a:r>
               <a:r>
                 <a:rPr lang="de-DE" i="0" dirty="0" smtClean="0"/>
-                <a:t> </a:t>
+                <a:t> Hudson/Jenkins</a:t>
               </a:r>
-              <a:r>
-                <a:rPr lang="de-DE" i="0" dirty="0" smtClean="0"/>
-                <a:t>Hudson/Jenkins</a:t>
-              </a:r>
-              <a:endParaRPr lang="de-DE" i="0" dirty="0" smtClean="0"/>
             </a:p>
           </p:txBody>
         </p:sp>
@@ -5012,23 +5007,7 @@
             </a:r>
             <a:r>
               <a:rPr lang="de-DE" sz="2000" dirty="0" smtClean="0"/>
-              <a:t> </a:t>
-            </a:r>
-            <a:r>
-              <a:rPr lang="de-DE" sz="2000" dirty="0" smtClean="0"/>
-              <a:t>H</a:t>
-            </a:r>
-            <a:r>
-              <a:rPr lang="de-DE" sz="2000" dirty="0" smtClean="0"/>
-              <a:t>udson/</a:t>
-            </a:r>
-            <a:r>
-              <a:rPr lang="de-DE" sz="2000" dirty="0" smtClean="0"/>
-              <a:t>J</a:t>
-            </a:r>
-            <a:r>
-              <a:rPr lang="de-DE" sz="2000" dirty="0" smtClean="0"/>
-              <a:t>enkins </a:t>
+              <a:t> Hudson/Jenkins </a:t>
             </a:r>
             <a:r>
               <a:rPr lang="de-DE" sz="2000" dirty="0" err="1" smtClean="0"/>
@@ -5847,88 +5826,9 @@
   <p:timing>
     <p:tnLst>
       <p:par>
-        <p:cTn id="1" dur="indefinite" restart="never" nodeType="tmRoot">
-          <p:childTnLst>
-            <p:seq concurrent="1" nextAc="seek">
-              <p:cTn id="2" dur="indefinite" nodeType="mainSeq">
-                <p:childTnLst>
-                  <p:par>
-                    <p:cTn id="3" fill="hold">
-                      <p:stCondLst>
-                        <p:cond delay="indefinite"/>
-                      </p:stCondLst>
-                      <p:childTnLst>
-                        <p:par>
-                          <p:cTn id="4" fill="hold">
-                            <p:stCondLst>
-                              <p:cond delay="0"/>
-                            </p:stCondLst>
-                            <p:childTnLst>
-                              <p:par>
-                                <p:cTn id="5" presetID="10" presetClass="entr" presetSubtype="0" fill="hold" grpId="0" nodeType="clickEffect">
-                                  <p:stCondLst>
-                                    <p:cond delay="0"/>
-                                  </p:stCondLst>
-                                  <p:childTnLst>
-                                    <p:set>
-                                      <p:cBhvr>
-                                        <p:cTn id="6" dur="1" fill="hold">
-                                          <p:stCondLst>
-                                            <p:cond delay="0"/>
-                                          </p:stCondLst>
-                                        </p:cTn>
-                                        <p:tgtEl>
-                                          <p:spTgt spid="9"/>
-                                        </p:tgtEl>
-                                        <p:attrNameLst>
-                                          <p:attrName>style.visibility</p:attrName>
-                                        </p:attrNameLst>
-                                      </p:cBhvr>
-                                      <p:to>
-                                        <p:strVal val="visible"/>
-                                      </p:to>
-                                    </p:set>
-                                    <p:animEffect transition="in" filter="fade">
-                                      <p:cBhvr>
-                                        <p:cTn id="7" dur="2000"/>
-                                        <p:tgtEl>
-                                          <p:spTgt spid="9"/>
-                                        </p:tgtEl>
-                                      </p:cBhvr>
-                                    </p:animEffect>
-                                  </p:childTnLst>
-                                </p:cTn>
-                              </p:par>
-                            </p:childTnLst>
-                          </p:cTn>
-                        </p:par>
-                      </p:childTnLst>
-                    </p:cTn>
-                  </p:par>
-                </p:childTnLst>
-              </p:cTn>
-              <p:prevCondLst>
-                <p:cond evt="onPrev" delay="0">
-                  <p:tgtEl>
-                    <p:sldTgt/>
-                  </p:tgtEl>
-                </p:cond>
-              </p:prevCondLst>
-              <p:nextCondLst>
-                <p:cond evt="onNext" delay="0">
-                  <p:tgtEl>
-                    <p:sldTgt/>
-                  </p:tgtEl>
-                </p:cond>
-              </p:nextCondLst>
-            </p:seq>
-          </p:childTnLst>
-        </p:cTn>
+        <p:cTn id="1" dur="indefinite" restart="never" nodeType="tmRoot"/>
       </p:par>
     </p:tnLst>
-    <p:bldLst>
-      <p:bldP spid="9" grpId="0" animBg="1"/>
-    </p:bldLst>
   </p:timing>
 </p:sld>
 </file>
@@ -6003,11 +5903,7 @@
             <a:pPr lvl="1"/>
             <a:r>
               <a:rPr lang="de-DE" sz="2000" b="1" dirty="0" smtClean="0"/>
-              <a:t>1.0.0.Alpha5 </a:t>
-            </a:r>
-            <a:r>
-              <a:rPr lang="de-DE" sz="2000" b="1" dirty="0" smtClean="0"/>
-              <a:t>out</a:t>
+              <a:t>1.0.0.Alpha5 out</a:t>
             </a:r>
             <a:r>
               <a:rPr lang="de-DE" sz="2000" dirty="0" smtClean="0"/>
@@ -6029,7 +5925,6 @@
               <a:rPr lang="de-DE" sz="2000" dirty="0" smtClean="0"/>
               <a:t> (-;</a:t>
             </a:r>
-            <a:endParaRPr lang="de-DE" sz="2000" dirty="0" smtClean="0"/>
           </a:p>
           <a:p>
             <a:pPr lvl="1"/>
@@ -6351,11 +6246,7 @@
             </a:r>
             <a:r>
               <a:rPr lang="de-DE" sz="2000" smtClean="0"/>
-              <a:t>://</a:t>
-            </a:r>
-            <a:r>
-              <a:rPr lang="de-DE" sz="2000" smtClean="0"/>
-              <a:t>github.com/michaelschuetz/seamArquillian-sdc2011</a:t>
+              <a:t>://github.com/michaelschuetz/seamArquillian-sdc2011</a:t>
             </a:r>
             <a:endParaRPr lang="de-DE" sz="2000" dirty="0" smtClean="0"/>
           </a:p>
@@ -6887,14 +6778,14 @@
           </a:ln>
           <a:extLst>
             <a:ext uri="{909E8E84-426E-40DD-AFC4-6F175D3DCCD1}">
-              <a14:hiddenFill xmlns:a14="http://schemas.microsoft.com/office/drawing/2010/main" xmlns="">
+              <a14:hiddenFill xmlns="" xmlns:a14="http://schemas.microsoft.com/office/drawing/2010/main">
                 <a:solidFill>
                   <a:srgbClr val="FFFFFF"/>
                 </a:solidFill>
               </a14:hiddenFill>
             </a:ext>
             <a:ext uri="{91240B29-F687-4F45-9708-019B960494DF}">
-              <a14:hiddenLine xmlns:a14="http://schemas.microsoft.com/office/drawing/2010/main" xmlns="" w="9525">
+              <a14:hiddenLine xmlns="" xmlns:a14="http://schemas.microsoft.com/office/drawing/2010/main" w="9525">
                 <a:solidFill>
                   <a:srgbClr val="000000"/>
                 </a:solidFill>
@@ -6984,14 +6875,14 @@
           </a:ln>
           <a:extLst>
             <a:ext uri="{909E8E84-426E-40DD-AFC4-6F175D3DCCD1}">
-              <a14:hiddenFill xmlns:a14="http://schemas.microsoft.com/office/drawing/2010/main" xmlns="">
+              <a14:hiddenFill xmlns="" xmlns:a14="http://schemas.microsoft.com/office/drawing/2010/main">
                 <a:solidFill>
                   <a:srgbClr val="FFFFFF"/>
                 </a:solidFill>
               </a14:hiddenFill>
             </a:ext>
             <a:ext uri="{91240B29-F687-4F45-9708-019B960494DF}">
-              <a14:hiddenLine xmlns:a14="http://schemas.microsoft.com/office/drawing/2010/main" xmlns="" w="9525">
+              <a14:hiddenLine xmlns="" xmlns:a14="http://schemas.microsoft.com/office/drawing/2010/main" w="9525">
                 <a:solidFill>
                   <a:srgbClr val="000000"/>
                 </a:solidFill>
@@ -7068,14 +6959,14 @@
           </a:ln>
           <a:extLst>
             <a:ext uri="{909E8E84-426E-40DD-AFC4-6F175D3DCCD1}">
-              <a14:hiddenFill xmlns:a14="http://schemas.microsoft.com/office/drawing/2010/main" xmlns="">
+              <a14:hiddenFill xmlns="" xmlns:a14="http://schemas.microsoft.com/office/drawing/2010/main">
                 <a:solidFill>
                   <a:srgbClr val="FFFFFF"/>
                 </a:solidFill>
               </a14:hiddenFill>
             </a:ext>
             <a:ext uri="{91240B29-F687-4F45-9708-019B960494DF}">
-              <a14:hiddenLine xmlns:a14="http://schemas.microsoft.com/office/drawing/2010/main" xmlns="" w="9525">
+              <a14:hiddenLine xmlns="" xmlns:a14="http://schemas.microsoft.com/office/drawing/2010/main" w="9525">
                 <a:solidFill>
                   <a:srgbClr val="000000"/>
                 </a:solidFill>
@@ -7181,14 +7072,14 @@
           </a:ln>
           <a:extLst>
             <a:ext uri="{909E8E84-426E-40DD-AFC4-6F175D3DCCD1}">
-              <a14:hiddenFill xmlns:a14="http://schemas.microsoft.com/office/drawing/2010/main" xmlns="">
+              <a14:hiddenFill xmlns="" xmlns:a14="http://schemas.microsoft.com/office/drawing/2010/main">
                 <a:solidFill>
                   <a:srgbClr val="FFFFFF"/>
                 </a:solidFill>
               </a14:hiddenFill>
             </a:ext>
             <a:ext uri="{91240B29-F687-4F45-9708-019B960494DF}">
-              <a14:hiddenLine xmlns:a14="http://schemas.microsoft.com/office/drawing/2010/main" xmlns="" w="9525">
+              <a14:hiddenLine xmlns="" xmlns:a14="http://schemas.microsoft.com/office/drawing/2010/main" w="9525">
                 <a:solidFill>
                   <a:srgbClr val="000000"/>
                 </a:solidFill>
@@ -7373,14 +7264,14 @@
           </a:ln>
           <a:extLst>
             <a:ext uri="{909E8E84-426E-40DD-AFC4-6F175D3DCCD1}">
-              <a14:hiddenFill xmlns:a14="http://schemas.microsoft.com/office/drawing/2010/main" xmlns="">
+              <a14:hiddenFill xmlns="" xmlns:a14="http://schemas.microsoft.com/office/drawing/2010/main">
                 <a:solidFill>
                   <a:srgbClr val="FFFFFF"/>
                 </a:solidFill>
               </a14:hiddenFill>
             </a:ext>
             <a:ext uri="{91240B29-F687-4F45-9708-019B960494DF}">
-              <a14:hiddenLine xmlns:a14="http://schemas.microsoft.com/office/drawing/2010/main" xmlns="" w="9525">
+              <a14:hiddenLine xmlns="" xmlns:a14="http://schemas.microsoft.com/office/drawing/2010/main" w="9525">
                 <a:solidFill>
                   <a:srgbClr val="000000"/>
                 </a:solidFill>
@@ -7432,19 +7323,6 @@
               </a:rPr>
               <a:t>BED-Con 2011 </a:t>
             </a:r>
-            <a:endParaRPr kumimoji="0" lang="de-DE" sz="2400" b="0" i="0" u="none" strike="noStrike" kern="0" cap="none" spc="0" normalizeH="0" baseline="0" noProof="0" dirty="0" smtClean="0">
-              <a:ln>
-                <a:noFill/>
-              </a:ln>
-              <a:solidFill>
-                <a:srgbClr val="3F3F3F"/>
-              </a:solidFill>
-              <a:effectLst/>
-              <a:uLnTx/>
-              <a:uFillTx/>
-              <a:latin typeface="Calibri" pitchFamily="34" charset="0"/>
-              <a:cs typeface="Calibri" pitchFamily="34" charset="0"/>
-            </a:endParaRPr>
           </a:p>
         </p:txBody>
       </p:sp>
@@ -8462,11 +8340,7 @@
             <a:pPr lvl="1"/>
             <a:r>
               <a:rPr lang="en-US" sz="2000" dirty="0" smtClean="0"/>
-              <a:t>Cool: Seam 3, CDI, Weld, Java EE 6, JSF 2, </a:t>
-            </a:r>
-            <a:r>
-              <a:rPr lang="en-US" sz="2000" dirty="0" smtClean="0"/>
-              <a:t>GF3, </a:t>
+              <a:t>Cool: Seam 3, CDI, Weld, Java EE 6, JSF 2, GF3, </a:t>
             </a:r>
             <a:r>
               <a:rPr lang="en-US" sz="2000" dirty="0" err="1" smtClean="0"/>
@@ -8474,11 +8348,7 @@
             </a:r>
             <a:r>
               <a:rPr lang="en-US" sz="2000" dirty="0" smtClean="0"/>
-              <a:t> </a:t>
-            </a:r>
-            <a:r>
-              <a:rPr lang="en-US" sz="2000" dirty="0" smtClean="0"/>
-              <a:t>6</a:t>
+              <a:t> 6</a:t>
             </a:r>
           </a:p>
           <a:p>
@@ -8492,23 +8362,7 @@
             <a:pPr lvl="2"/>
             <a:r>
               <a:rPr lang="en-US" sz="2000" dirty="0" smtClean="0"/>
-              <a:t>First final release of </a:t>
-            </a:r>
-            <a:r>
-              <a:rPr lang="en-US" sz="2000" dirty="0" smtClean="0"/>
-              <a:t>hole </a:t>
-            </a:r>
-            <a:r>
-              <a:rPr lang="en-US" sz="2000" dirty="0" smtClean="0"/>
-              <a:t>bundle</a:t>
-            </a:r>
-            <a:r>
-              <a:rPr lang="en-US" sz="2000" dirty="0" smtClean="0"/>
-              <a:t> </a:t>
-            </a:r>
-            <a:r>
-              <a:rPr lang="en-US" sz="2000" dirty="0" smtClean="0"/>
-              <a:t>3 days old (-:</a:t>
+              <a:t>First final release of hole bundle 3 days old (-:</a:t>
             </a:r>
             <a:endParaRPr lang="en-US" dirty="0" smtClean="0"/>
           </a:p>
@@ -8537,17 +8391,12 @@
               <a:rPr lang="en-US" sz="2000" dirty="0" smtClean="0"/>
               <a:t> + JBoss AS 5.1)</a:t>
             </a:r>
-            <a:endParaRPr lang="en-US" sz="2000" dirty="0" smtClean="0"/>
           </a:p>
           <a:p>
             <a:pPr lvl="1"/>
             <a:r>
               <a:rPr lang="en-US" sz="2000" dirty="0" smtClean="0"/>
-              <a:t>No </a:t>
-            </a:r>
-            <a:r>
-              <a:rPr lang="en-US" sz="2000" dirty="0" smtClean="0"/>
-              <a:t>JSF 2 </a:t>
+              <a:t>No JSF 2 </a:t>
             </a:r>
             <a:r>
               <a:rPr lang="en-US" sz="2000" dirty="0" err="1" smtClean="0"/>
@@ -8555,11 +8404,7 @@
             </a:r>
             <a:r>
               <a:rPr lang="en-US" sz="2000" dirty="0" smtClean="0"/>
-              <a:t> Bridge ready to </a:t>
-            </a:r>
-            <a:r>
-              <a:rPr lang="en-US" sz="2000" dirty="0" smtClean="0"/>
-              <a:t>use</a:t>
+              <a:t> Bridge ready to use</a:t>
             </a:r>
           </a:p>
           <a:p>
@@ -8574,27 +8419,14 @@
             </a:r>
             <a:r>
               <a:rPr lang="en-US" sz="2000" dirty="0" smtClean="0"/>
-              <a:t> Bridge </a:t>
-            </a:r>
+              <a:t> Bridge 3.0.0.ALPHA (JSF2 + CDI + Seam3)</a:t>
+            </a:r>
+          </a:p>
+          <a:p>
+            <a:pPr lvl="1"/>
             <a:r>
               <a:rPr lang="en-US" sz="2000" dirty="0" smtClean="0"/>
-              <a:t>3.0.0.ALPHA (JSF2 + CDI + Seam3)</a:t>
-            </a:r>
-            <a:endParaRPr lang="en-US" sz="2000" dirty="0" smtClean="0"/>
-          </a:p>
-          <a:p>
-            <a:pPr lvl="1"/>
-            <a:r>
-              <a:rPr lang="en-US" sz="2000" dirty="0" smtClean="0"/>
-              <a:t>JBossAS6 final since end </a:t>
-            </a:r>
-            <a:r>
-              <a:rPr lang="en-US" sz="2000" dirty="0" smtClean="0"/>
-              <a:t>of </a:t>
-            </a:r>
-            <a:r>
-              <a:rPr lang="en-US" sz="2000" dirty="0" smtClean="0"/>
-              <a:t>2010</a:t>
+              <a:t>JBossAS6 final since end of 2010</a:t>
             </a:r>
           </a:p>
           <a:p>
@@ -8611,7 +8443,6 @@
               <a:rPr lang="en-US" sz="2000" dirty="0" smtClean="0"/>
               <a:t> portal integration</a:t>
             </a:r>
-            <a:endParaRPr lang="en-US" sz="2000" dirty="0" smtClean="0"/>
           </a:p>
           <a:p>
             <a:pPr lvl="1">
@@ -12438,6 +12269,21 @@
 </file>
 
 <file path=customXml/item1.xml><?xml version="1.0" encoding="utf-8"?>
+<p:properties xmlns:p="http://schemas.microsoft.com/office/2006/metadata/properties" xmlns:xsi="http://www.w3.org/2001/XMLSchema-instance">
+  <documentManagement/>
+</p:properties>
+</file>
+
+<file path=customXml/item2.xml><?xml version="1.0" encoding="utf-8"?>
+<?mso-contentType ?>
+<FormTemplates xmlns="http://schemas.microsoft.com/sharepoint/v3/contenttype/forms">
+  <Display>DocumentLibraryForm</Display>
+  <Edit>DocumentLibraryForm</Edit>
+  <New>DocumentLibraryForm</New>
+</FormTemplates>
+</file>
+
+<file path=customXml/item3.xml><?xml version="1.0" encoding="utf-8"?>
 <ct:contentTypeSchema xmlns:ct="http://schemas.microsoft.com/office/2006/metadata/contentType" xmlns:ma="http://schemas.microsoft.com/office/2006/metadata/properties/metaAttributes" ct:_="" ma:_="" ma:contentTypeName="Dokument" ma:contentTypeID="0x01010013E92FB4F0E35945A177EEC2242ABF8A" ma:contentTypeVersion="1" ma:contentTypeDescription="Ein neues Dokument erstellen." ma:contentTypeScope="" ma:versionID="d2cf3a726627425c3604448812c626dc">
   <xsd:schema xmlns:xsd="http://www.w3.org/2001/XMLSchema" xmlns:p="http://schemas.microsoft.com/office/2006/metadata/properties" targetNamespace="http://schemas.microsoft.com/office/2006/metadata/properties" ma:root="true" ma:fieldsID="bf0b6019ab54b64ea4206d6353e55016">
     <xsd:element name="properties">
@@ -12486,32 +12332,10 @@
 </ct:contentTypeSchema>
 </file>
 
-<file path=customXml/item2.xml><?xml version="1.0" encoding="utf-8"?>
-<?mso-contentType ?>
-<FormTemplates xmlns="http://schemas.microsoft.com/sharepoint/v3/contenttype/forms">
-  <Display>DocumentLibraryForm</Display>
-  <Edit>DocumentLibraryForm</Edit>
-  <New>DocumentLibraryForm</New>
-</FormTemplates>
-</file>
-
-<file path=customXml/item3.xml><?xml version="1.0" encoding="utf-8"?>
-<p:properties xmlns:p="http://schemas.microsoft.com/office/2006/metadata/properties" xmlns:xsi="http://www.w3.org/2001/XMLSchema-instance">
-  <documentManagement/>
-</p:properties>
-</file>
-
 <file path=customXml/itemProps1.xml><?xml version="1.0" encoding="utf-8"?>
-<ds:datastoreItem xmlns:ds="http://schemas.openxmlformats.org/officeDocument/2006/customXml" ds:itemID="{9F6416C8-433A-4551-934F-62352999253F}">
+<ds:datastoreItem xmlns:ds="http://schemas.openxmlformats.org/officeDocument/2006/customXml" ds:itemID="{35A4017D-26DD-4BAA-A2EC-766517FD49C2}">
   <ds:schemaRefs>
-    <ds:schemaRef ds:uri="http://schemas.microsoft.com/office/2006/metadata/contentType"/>
-    <ds:schemaRef ds:uri="http://schemas.microsoft.com/office/2006/metadata/properties/metaAttributes"/>
-    <ds:schemaRef ds:uri="http://www.w3.org/2001/XMLSchema"/>
     <ds:schemaRef ds:uri="http://schemas.microsoft.com/office/2006/metadata/properties"/>
-    <ds:schemaRef ds:uri="http://schemas.openxmlformats.org/package/2006/metadata/core-properties"/>
-    <ds:schemaRef ds:uri="http://purl.org/dc/elements/1.1/"/>
-    <ds:schemaRef ds:uri="http://purl.org/dc/terms/"/>
-    <ds:schemaRef ds:uri="http://schemas.microsoft.com/office/internal/2005/internalDocumentation"/>
   </ds:schemaRefs>
 </ds:datastoreItem>
 </file>
@@ -12525,9 +12349,16 @@
 </file>
 
 <file path=customXml/itemProps3.xml><?xml version="1.0" encoding="utf-8"?>
-<ds:datastoreItem xmlns:ds="http://schemas.openxmlformats.org/officeDocument/2006/customXml" ds:itemID="{35A4017D-26DD-4BAA-A2EC-766517FD49C2}">
+<ds:datastoreItem xmlns:ds="http://schemas.openxmlformats.org/officeDocument/2006/customXml" ds:itemID="{9F6416C8-433A-4551-934F-62352999253F}">
   <ds:schemaRefs>
+    <ds:schemaRef ds:uri="http://schemas.microsoft.com/office/2006/metadata/contentType"/>
+    <ds:schemaRef ds:uri="http://schemas.microsoft.com/office/2006/metadata/properties/metaAttributes"/>
+    <ds:schemaRef ds:uri="http://www.w3.org/2001/XMLSchema"/>
     <ds:schemaRef ds:uri="http://schemas.microsoft.com/office/2006/metadata/properties"/>
+    <ds:schemaRef ds:uri="http://schemas.openxmlformats.org/package/2006/metadata/core-properties"/>
+    <ds:schemaRef ds:uri="http://purl.org/dc/elements/1.1/"/>
+    <ds:schemaRef ds:uri="http://purl.org/dc/terms/"/>
+    <ds:schemaRef ds:uri="http://schemas.microsoft.com/office/internal/2005/internalDocumentation"/>
   </ds:schemaRefs>
 </ds:datastoreItem>
 </file>
</xml_diff>

<commit_message>
update slides, do provide pdf version
</commit_message>
<xml_diff>
--- a/doc/sdc_SeamArquillian.pptx
+++ b/doc/sdc_SeamArquillian.pptx
@@ -7,6 +7,9 @@
   <p:notesMasterIdLst>
     <p:notesMasterId r:id="rId21"/>
   </p:notesMasterIdLst>
+  <p:handoutMasterIdLst>
+    <p:handoutMasterId r:id="rId22"/>
+  </p:handoutMasterIdLst>
   <p:sldIdLst>
     <p:sldId id="436" r:id="rId5"/>
     <p:sldId id="419" r:id="rId6"/>
@@ -21,7 +24,7 @@
     <p:sldId id="435" r:id="rId15"/>
     <p:sldId id="429" r:id="rId16"/>
     <p:sldId id="430" r:id="rId17"/>
-    <p:sldId id="431" r:id="rId18"/>
+    <p:sldId id="437" r:id="rId18"/>
     <p:sldId id="432" r:id="rId19"/>
     <p:sldId id="433" r:id="rId20"/>
   </p:sldIdLst>
@@ -153,6 +156,166 @@
     </a:lvl9pPr>
   </p:defaultTextStyle>
 </p:presentation>
+</file>
+
+<file path=ppt/handoutMasters/handoutMaster1.xml><?xml version="1.0" encoding="utf-8"?>
+<p:handoutMaster xmlns:a="http://schemas.openxmlformats.org/drawingml/2006/main" xmlns:r="http://schemas.openxmlformats.org/officeDocument/2006/relationships" xmlns:p="http://schemas.openxmlformats.org/presentationml/2006/main">
+  <p:cSld>
+    <p:bg>
+      <p:bgRef idx="1001">
+        <a:schemeClr val="bg1"/>
+      </p:bgRef>
+    </p:bg>
+    <p:spTree>
+      <p:nvGrpSpPr>
+        <p:cNvPr id="1" name=""/>
+        <p:cNvGrpSpPr/>
+        <p:nvPr/>
+      </p:nvGrpSpPr>
+      <p:grpSpPr>
+        <a:xfrm>
+          <a:off x="0" y="0"/>
+          <a:ext cx="0" cy="0"/>
+          <a:chOff x="0" y="0"/>
+          <a:chExt cx="0" cy="0"/>
+        </a:xfrm>
+      </p:grpSpPr>
+      <p:sp>
+        <p:nvSpPr>
+          <p:cNvPr id="2" name="Kopfzeilenplatzhalter 1"/>
+          <p:cNvSpPr>
+            <a:spLocks noGrp="1"/>
+          </p:cNvSpPr>
+          <p:nvPr>
+            <p:ph type="hdr" sz="quarter"/>
+          </p:nvPr>
+        </p:nvSpPr>
+        <p:spPr>
+          <a:xfrm>
+            <a:off x="0" y="0"/>
+            <a:ext cx="3076575" cy="511175"/>
+          </a:xfrm>
+          <a:prstGeom prst="rect">
+            <a:avLst/>
+          </a:prstGeom>
+        </p:spPr>
+        <p:txBody>
+          <a:bodyPr vert="horz" lIns="91440" tIns="45720" rIns="91440" bIns="45720" rtlCol="0"/>
+          <a:lstStyle>
+            <a:lvl1pPr algn="l">
+              <a:defRPr sz="1200"/>
+            </a:lvl1pPr>
+          </a:lstStyle>
+          <a:p>
+            <a:endParaRPr lang="de-DE"/>
+          </a:p>
+        </p:txBody>
+      </p:sp>
+      <p:sp>
+        <p:nvSpPr>
+          <p:cNvPr id="3" name="Datumsplatzhalter 2"/>
+          <p:cNvSpPr>
+            <a:spLocks noGrp="1"/>
+          </p:cNvSpPr>
+          <p:nvPr>
+            <p:ph type="dt" sz="quarter" idx="1"/>
+          </p:nvPr>
+        </p:nvSpPr>
+        <p:spPr>
+          <a:xfrm>
+            <a:off x="4021138" y="0"/>
+            <a:ext cx="3076575" cy="511175"/>
+          </a:xfrm>
+          <a:prstGeom prst="rect">
+            <a:avLst/>
+          </a:prstGeom>
+        </p:spPr>
+        <p:txBody>
+          <a:bodyPr vert="horz" lIns="91440" tIns="45720" rIns="91440" bIns="45720" rtlCol="0"/>
+          <a:lstStyle>
+            <a:lvl1pPr algn="r">
+              <a:defRPr sz="1200"/>
+            </a:lvl1pPr>
+          </a:lstStyle>
+          <a:p>
+            <a:fld id="{CAE8B47A-F057-42A6-A398-00F78FC959B0}" type="datetimeFigureOut">
+              <a:rPr lang="de-DE" smtClean="0"/>
+              <a:t>03.04.2011</a:t>
+            </a:fld>
+            <a:endParaRPr lang="de-DE"/>
+          </a:p>
+        </p:txBody>
+      </p:sp>
+      <p:sp>
+        <p:nvSpPr>
+          <p:cNvPr id="4" name="Fußzeilenplatzhalter 3"/>
+          <p:cNvSpPr>
+            <a:spLocks noGrp="1"/>
+          </p:cNvSpPr>
+          <p:nvPr>
+            <p:ph type="ftr" sz="quarter" idx="2"/>
+          </p:nvPr>
+        </p:nvSpPr>
+        <p:spPr>
+          <a:xfrm>
+            <a:off x="0" y="9721850"/>
+            <a:ext cx="3076575" cy="511175"/>
+          </a:xfrm>
+          <a:prstGeom prst="rect">
+            <a:avLst/>
+          </a:prstGeom>
+        </p:spPr>
+        <p:txBody>
+          <a:bodyPr vert="horz" lIns="91440" tIns="45720" rIns="91440" bIns="45720" rtlCol="0" anchor="b"/>
+          <a:lstStyle>
+            <a:lvl1pPr algn="l">
+              <a:defRPr sz="1200"/>
+            </a:lvl1pPr>
+          </a:lstStyle>
+          <a:p>
+            <a:endParaRPr lang="de-DE"/>
+          </a:p>
+        </p:txBody>
+      </p:sp>
+      <p:sp>
+        <p:nvSpPr>
+          <p:cNvPr id="5" name="Foliennummernplatzhalter 4"/>
+          <p:cNvSpPr>
+            <a:spLocks noGrp="1"/>
+          </p:cNvSpPr>
+          <p:nvPr>
+            <p:ph type="sldNum" sz="quarter" idx="3"/>
+          </p:nvPr>
+        </p:nvSpPr>
+        <p:spPr>
+          <a:xfrm>
+            <a:off x="4021138" y="9721850"/>
+            <a:ext cx="3076575" cy="511175"/>
+          </a:xfrm>
+          <a:prstGeom prst="rect">
+            <a:avLst/>
+          </a:prstGeom>
+        </p:spPr>
+        <p:txBody>
+          <a:bodyPr vert="horz" lIns="91440" tIns="45720" rIns="91440" bIns="45720" rtlCol="0" anchor="b"/>
+          <a:lstStyle>
+            <a:lvl1pPr algn="r">
+              <a:defRPr sz="1200"/>
+            </a:lvl1pPr>
+          </a:lstStyle>
+          <a:p>
+            <a:fld id="{6E34004E-3F14-4021-B688-35877AB4F895}" type="slidenum">
+              <a:rPr lang="de-DE" smtClean="0"/>
+              <a:t>‹Nr.›</a:t>
+            </a:fld>
+            <a:endParaRPr lang="de-DE"/>
+          </a:p>
+        </p:txBody>
+      </p:sp>
+    </p:spTree>
+  </p:cSld>
+  <p:clrMap bg1="lt1" tx1="dk1" bg2="lt2" tx2="dk2" accent1="accent1" accent2="accent2" accent3="accent3" accent4="accent4" accent5="accent5" accent6="accent6" hlink="hlink" folHlink="folHlink"/>
+</p:handoutMaster>
 </file>
 
 <file path=ppt/notesMasters/notesMaster1.xml><?xml version="1.0" encoding="utf-8"?>
@@ -3917,7 +4080,7 @@
             <a:fld id="{98405E6C-AB5C-49C6-8300-E0D31946C0F1}" type="datetime1">
               <a:rPr lang="de-DE" smtClean="0"/>
               <a:pPr/>
-              <a:t>03.04.2011</a:t>
+              <a:t>04.04.2011</a:t>
             </a:fld>
             <a:endParaRPr lang="de-DE"/>
           </a:p>
@@ -3939,8 +4102,16 @@
           <a:lstStyle/>
           <a:p>
             <a:r>
-              <a:rPr lang="de-DE" smtClean="0"/>
-              <a:t>Copyright © 2010 – akquinet AG</a:t>
+              <a:rPr lang="de-DE" dirty="0" smtClean="0"/>
+              <a:t>Copyright © </a:t>
+            </a:r>
+            <a:r>
+              <a:rPr lang="de-DE" dirty="0" smtClean="0"/>
+              <a:t>2011 </a:t>
+            </a:r>
+            <a:r>
+              <a:rPr lang="de-DE" dirty="0" smtClean="0"/>
+              <a:t>– akquinet AG</a:t>
             </a:r>
             <a:endParaRPr lang="de-DE" dirty="0"/>
           </a:p>
@@ -4476,7 +4647,7 @@
             <a:fld id="{98405E6C-AB5C-49C6-8300-E0D31946C0F1}" type="datetime1">
               <a:rPr lang="de-DE" smtClean="0"/>
               <a:pPr/>
-              <a:t>03.04.2011</a:t>
+              <a:t>04.04.2011</a:t>
             </a:fld>
             <a:endParaRPr lang="de-DE"/>
           </a:p>
@@ -4498,8 +4669,16 @@
           <a:lstStyle/>
           <a:p>
             <a:r>
-              <a:rPr lang="de-DE" smtClean="0"/>
-              <a:t>Copyright © 2010 – akquinet AG</a:t>
+              <a:rPr lang="de-DE" dirty="0" smtClean="0"/>
+              <a:t>Copyright © </a:t>
+            </a:r>
+            <a:r>
+              <a:rPr lang="de-DE" dirty="0" smtClean="0"/>
+              <a:t>2011 </a:t>
+            </a:r>
+            <a:r>
+              <a:rPr lang="de-DE" dirty="0" smtClean="0"/>
+              <a:t>– akquinet AG</a:t>
             </a:r>
             <a:endParaRPr lang="de-DE" dirty="0"/>
           </a:p>
@@ -5264,7 +5443,7 @@
             <a:fld id="{98405E6C-AB5C-49C6-8300-E0D31946C0F1}" type="datetime1">
               <a:rPr lang="de-DE" smtClean="0"/>
               <a:pPr/>
-              <a:t>03.04.2011</a:t>
+              <a:t>04.04.2011</a:t>
             </a:fld>
             <a:endParaRPr lang="de-DE"/>
           </a:p>
@@ -5286,8 +5465,16 @@
           <a:lstStyle/>
           <a:p>
             <a:r>
-              <a:rPr lang="de-DE" smtClean="0"/>
-              <a:t>Copyright © 2010 – akquinet AG</a:t>
+              <a:rPr lang="de-DE" dirty="0" smtClean="0"/>
+              <a:t>Copyright © </a:t>
+            </a:r>
+            <a:r>
+              <a:rPr lang="de-DE" dirty="0" smtClean="0"/>
+              <a:t>2011 </a:t>
+            </a:r>
+            <a:r>
+              <a:rPr lang="de-DE" dirty="0" smtClean="0"/>
+              <a:t>– akquinet AG</a:t>
             </a:r>
             <a:endParaRPr lang="de-DE" dirty="0"/>
           </a:p>
@@ -5549,7 +5736,7 @@
             <a:fld id="{98405E6C-AB5C-49C6-8300-E0D31946C0F1}" type="datetime1">
               <a:rPr lang="de-DE" smtClean="0"/>
               <a:pPr/>
-              <a:t>03.04.2011</a:t>
+              <a:t>04.04.2011</a:t>
             </a:fld>
             <a:endParaRPr lang="de-DE"/>
           </a:p>
@@ -5565,14 +5752,27 @@
             <p:ph type="ftr" sz="quarter" idx="3"/>
           </p:nvPr>
         </p:nvSpPr>
-        <p:spPr/>
+        <p:spPr>
+          <a:xfrm>
+            <a:off x="323850" y="6601800"/>
+            <a:ext cx="6913563" cy="153888"/>
+          </a:xfrm>
+        </p:spPr>
         <p:txBody>
           <a:bodyPr/>
           <a:lstStyle/>
           <a:p>
             <a:r>
-              <a:rPr lang="de-DE" smtClean="0"/>
-              <a:t>Copyright © 2010 – akquinet AG</a:t>
+              <a:rPr lang="de-DE" dirty="0" smtClean="0"/>
+              <a:t>Copyright © </a:t>
+            </a:r>
+            <a:r>
+              <a:rPr lang="de-DE" dirty="0" smtClean="0"/>
+              <a:t>2011 </a:t>
+            </a:r>
+            <a:r>
+              <a:rPr lang="de-DE" dirty="0" smtClean="0"/>
+              <a:t>– akquinet AG</a:t>
             </a:r>
             <a:endParaRPr lang="de-DE" dirty="0"/>
           </a:p>
@@ -5706,7 +5906,7 @@
             <a:fld id="{98405E6C-AB5C-49C6-8300-E0D31946C0F1}" type="datetime1">
               <a:rPr lang="de-DE" smtClean="0"/>
               <a:pPr/>
-              <a:t>03.04.2011</a:t>
+              <a:t>04.04.2011</a:t>
             </a:fld>
             <a:endParaRPr lang="de-DE"/>
           </a:p>
@@ -5728,8 +5928,16 @@
           <a:lstStyle/>
           <a:p>
             <a:r>
-              <a:rPr lang="de-DE" smtClean="0"/>
-              <a:t>Copyright © 2010 – akquinet AG</a:t>
+              <a:rPr lang="de-DE" dirty="0" smtClean="0"/>
+              <a:t>Copyright © </a:t>
+            </a:r>
+            <a:r>
+              <a:rPr lang="de-DE" dirty="0" smtClean="0"/>
+              <a:t>2011 </a:t>
+            </a:r>
+            <a:r>
+              <a:rPr lang="de-DE" dirty="0" smtClean="0"/>
+              <a:t>– akquinet AG</a:t>
             </a:r>
             <a:endParaRPr lang="de-DE" dirty="0"/>
           </a:p>
@@ -5785,7 +5993,7 @@
       </p:sp>
       <p:pic>
         <p:nvPicPr>
-          <p:cNvPr id="1026" name="Picture 2"/>
+          <p:cNvPr id="10" name="Picture 2"/>
           <p:cNvPicPr>
             <a:picLocks noChangeAspect="1" noChangeArrowheads="1"/>
           </p:cNvPicPr>
@@ -5800,7 +6008,7 @@
         </p:blipFill>
         <p:spPr bwMode="auto">
           <a:xfrm>
-            <a:off x="844103" y="1268760"/>
+            <a:off x="844103" y="1177294"/>
             <a:ext cx="7328297" cy="4975670"/>
           </a:xfrm>
           <a:prstGeom prst="rect">
@@ -5826,9 +6034,88 @@
   <p:timing>
     <p:tnLst>
       <p:par>
-        <p:cTn id="1" dur="indefinite" restart="never" nodeType="tmRoot"/>
+        <p:cTn id="1" dur="indefinite" restart="never" nodeType="tmRoot">
+          <p:childTnLst>
+            <p:seq concurrent="1" nextAc="seek">
+              <p:cTn id="2" dur="indefinite" nodeType="mainSeq">
+                <p:childTnLst>
+                  <p:par>
+                    <p:cTn id="3" fill="hold">
+                      <p:stCondLst>
+                        <p:cond delay="indefinite"/>
+                      </p:stCondLst>
+                      <p:childTnLst>
+                        <p:par>
+                          <p:cTn id="4" fill="hold">
+                            <p:stCondLst>
+                              <p:cond delay="0"/>
+                            </p:stCondLst>
+                            <p:childTnLst>
+                              <p:par>
+                                <p:cTn id="5" presetID="10" presetClass="entr" presetSubtype="0" fill="hold" grpId="0" nodeType="clickEffect">
+                                  <p:stCondLst>
+                                    <p:cond delay="0"/>
+                                  </p:stCondLst>
+                                  <p:childTnLst>
+                                    <p:set>
+                                      <p:cBhvr>
+                                        <p:cTn id="6" dur="1" fill="hold">
+                                          <p:stCondLst>
+                                            <p:cond delay="0"/>
+                                          </p:stCondLst>
+                                        </p:cTn>
+                                        <p:tgtEl>
+                                          <p:spTgt spid="9"/>
+                                        </p:tgtEl>
+                                        <p:attrNameLst>
+                                          <p:attrName>style.visibility</p:attrName>
+                                        </p:attrNameLst>
+                                      </p:cBhvr>
+                                      <p:to>
+                                        <p:strVal val="visible"/>
+                                      </p:to>
+                                    </p:set>
+                                    <p:animEffect transition="in" filter="fade">
+                                      <p:cBhvr>
+                                        <p:cTn id="7" dur="2000"/>
+                                        <p:tgtEl>
+                                          <p:spTgt spid="9"/>
+                                        </p:tgtEl>
+                                      </p:cBhvr>
+                                    </p:animEffect>
+                                  </p:childTnLst>
+                                </p:cTn>
+                              </p:par>
+                            </p:childTnLst>
+                          </p:cTn>
+                        </p:par>
+                      </p:childTnLst>
+                    </p:cTn>
+                  </p:par>
+                </p:childTnLst>
+              </p:cTn>
+              <p:prevCondLst>
+                <p:cond evt="onPrev" delay="0">
+                  <p:tgtEl>
+                    <p:sldTgt/>
+                  </p:tgtEl>
+                </p:cond>
+              </p:prevCondLst>
+              <p:nextCondLst>
+                <p:cond evt="onNext" delay="0">
+                  <p:tgtEl>
+                    <p:sldTgt/>
+                  </p:tgtEl>
+                </p:cond>
+              </p:nextCondLst>
+            </p:seq>
+          </p:childTnLst>
+        </p:cTn>
       </p:par>
     </p:tnLst>
+    <p:bldLst>
+      <p:bldP spid="9" grpId="0" animBg="1"/>
+    </p:bldLst>
   </p:timing>
 </p:sld>
 </file>
@@ -6080,7 +6367,7 @@
             <a:fld id="{98405E6C-AB5C-49C6-8300-E0D31946C0F1}" type="datetime1">
               <a:rPr lang="de-DE" smtClean="0"/>
               <a:pPr/>
-              <a:t>03.04.2011</a:t>
+              <a:t>04.04.2011</a:t>
             </a:fld>
             <a:endParaRPr lang="de-DE"/>
           </a:p>
@@ -6102,8 +6389,16 @@
           <a:lstStyle/>
           <a:p>
             <a:r>
-              <a:rPr lang="de-DE" smtClean="0"/>
-              <a:t>Copyright © 2010 – akquinet AG</a:t>
+              <a:rPr lang="de-DE" dirty="0" smtClean="0"/>
+              <a:t>Copyright © </a:t>
+            </a:r>
+            <a:r>
+              <a:rPr lang="de-DE" dirty="0" smtClean="0"/>
+              <a:t>2011 </a:t>
+            </a:r>
+            <a:r>
+              <a:rPr lang="de-DE" dirty="0" smtClean="0"/>
+              <a:t>– akquinet AG</a:t>
             </a:r>
             <a:endParaRPr lang="de-DE" dirty="0"/>
           </a:p>
@@ -6300,7 +6595,7 @@
             <a:fld id="{98405E6C-AB5C-49C6-8300-E0D31946C0F1}" type="datetime1">
               <a:rPr lang="de-DE" smtClean="0"/>
               <a:pPr/>
-              <a:t>03.04.2011</a:t>
+              <a:t>04.04.2011</a:t>
             </a:fld>
             <a:endParaRPr lang="de-DE"/>
           </a:p>
@@ -6323,7 +6618,15 @@
           <a:p>
             <a:r>
               <a:rPr lang="de-DE" smtClean="0"/>
-              <a:t>Copyright © 2010 – akquinet AG</a:t>
+              <a:t>Copyright © </a:t>
+            </a:r>
+            <a:r>
+              <a:rPr lang="de-DE" smtClean="0"/>
+              <a:t>2011 </a:t>
+            </a:r>
+            <a:r>
+              <a:rPr lang="de-DE" smtClean="0"/>
+              <a:t>– akquinet AG</a:t>
             </a:r>
             <a:endParaRPr lang="de-DE" dirty="0"/>
           </a:p>
@@ -6665,7 +6968,7 @@
             <a:fld id="{98405E6C-AB5C-49C6-8300-E0D31946C0F1}" type="datetime1">
               <a:rPr lang="de-DE" smtClean="0"/>
               <a:pPr/>
-              <a:t>03.04.2011</a:t>
+              <a:t>04.04.2011</a:t>
             </a:fld>
             <a:endParaRPr lang="de-DE"/>
           </a:p>
@@ -6687,8 +6990,16 @@
           <a:lstStyle/>
           <a:p>
             <a:r>
-              <a:rPr lang="de-DE" smtClean="0"/>
-              <a:t>Copyright © 2010 – akquinet AG</a:t>
+              <a:rPr lang="de-DE" dirty="0" smtClean="0"/>
+              <a:t>Copyright © </a:t>
+            </a:r>
+            <a:r>
+              <a:rPr lang="de-DE" dirty="0" smtClean="0"/>
+              <a:t>2011 </a:t>
+            </a:r>
+            <a:r>
+              <a:rPr lang="de-DE" dirty="0" smtClean="0"/>
+              <a:t>– akquinet AG</a:t>
             </a:r>
             <a:endParaRPr lang="de-DE" dirty="0"/>
           </a:p>
@@ -7862,7 +8173,7 @@
             <a:fld id="{98405E6C-AB5C-49C6-8300-E0D31946C0F1}" type="datetime1">
               <a:rPr lang="de-DE" smtClean="0"/>
               <a:pPr/>
-              <a:t>03.04.2011</a:t>
+              <a:t>04.04.2011</a:t>
             </a:fld>
             <a:endParaRPr lang="de-DE"/>
           </a:p>
@@ -7884,8 +8195,16 @@
           <a:lstStyle/>
           <a:p>
             <a:r>
-              <a:rPr lang="de-DE" smtClean="0"/>
-              <a:t>Copyright © 2010 – akquinet AG</a:t>
+              <a:rPr lang="de-DE" dirty="0" smtClean="0"/>
+              <a:t>Copyright © </a:t>
+            </a:r>
+            <a:r>
+              <a:rPr lang="de-DE" dirty="0" smtClean="0"/>
+              <a:t>2011 </a:t>
+            </a:r>
+            <a:r>
+              <a:rPr lang="de-DE" dirty="0" smtClean="0"/>
+              <a:t>– akquinet AG</a:t>
             </a:r>
             <a:endParaRPr lang="de-DE" dirty="0"/>
           </a:p>
@@ -8494,7 +8813,7 @@
             <a:fld id="{98405E6C-AB5C-49C6-8300-E0D31946C0F1}" type="datetime1">
               <a:rPr lang="de-DE" smtClean="0"/>
               <a:pPr/>
-              <a:t>03.04.2011</a:t>
+              <a:t>04.04.2011</a:t>
             </a:fld>
             <a:endParaRPr lang="de-DE"/>
           </a:p>
@@ -8516,8 +8835,16 @@
           <a:lstStyle/>
           <a:p>
             <a:r>
-              <a:rPr lang="de-DE" smtClean="0"/>
-              <a:t>Copyright © 2010 – akquinet AG</a:t>
+              <a:rPr lang="de-DE" dirty="0" smtClean="0"/>
+              <a:t>Copyright © </a:t>
+            </a:r>
+            <a:r>
+              <a:rPr lang="de-DE" dirty="0" smtClean="0"/>
+              <a:t>2011 </a:t>
+            </a:r>
+            <a:r>
+              <a:rPr lang="de-DE" dirty="0" smtClean="0"/>
+              <a:t>– akquinet AG</a:t>
             </a:r>
             <a:endParaRPr lang="de-DE" dirty="0"/>
           </a:p>
@@ -8850,7 +9177,7 @@
             <a:fld id="{98405E6C-AB5C-49C6-8300-E0D31946C0F1}" type="datetime1">
               <a:rPr lang="de-DE" smtClean="0"/>
               <a:pPr/>
-              <a:t>03.04.2011</a:t>
+              <a:t>04.04.2011</a:t>
             </a:fld>
             <a:endParaRPr lang="de-DE"/>
           </a:p>
@@ -8872,8 +9199,16 @@
           <a:lstStyle/>
           <a:p>
             <a:r>
-              <a:rPr lang="de-DE" smtClean="0"/>
-              <a:t>Copyright © 2010 – akquinet AG</a:t>
+              <a:rPr lang="de-DE" dirty="0" smtClean="0"/>
+              <a:t>Copyright © </a:t>
+            </a:r>
+            <a:r>
+              <a:rPr lang="de-DE" dirty="0" smtClean="0"/>
+              <a:t>2011 </a:t>
+            </a:r>
+            <a:r>
+              <a:rPr lang="de-DE" dirty="0" smtClean="0"/>
+              <a:t>– akquinet AG</a:t>
             </a:r>
             <a:endParaRPr lang="de-DE" dirty="0"/>
           </a:p>
@@ -9061,7 +9396,7 @@
             <a:fld id="{98405E6C-AB5C-49C6-8300-E0D31946C0F1}" type="datetime1">
               <a:rPr lang="de-DE" smtClean="0"/>
               <a:pPr/>
-              <a:t>03.04.2011</a:t>
+              <a:t>04.04.2011</a:t>
             </a:fld>
             <a:endParaRPr lang="de-DE"/>
           </a:p>
@@ -9083,8 +9418,16 @@
           <a:lstStyle/>
           <a:p>
             <a:r>
-              <a:rPr lang="de-DE" smtClean="0"/>
-              <a:t>Copyright © 2010 – akquinet AG</a:t>
+              <a:rPr lang="de-DE" dirty="0" smtClean="0"/>
+              <a:t>Copyright © </a:t>
+            </a:r>
+            <a:r>
+              <a:rPr lang="de-DE" dirty="0" smtClean="0"/>
+              <a:t>2011 </a:t>
+            </a:r>
+            <a:r>
+              <a:rPr lang="de-DE" dirty="0" smtClean="0"/>
+              <a:t>– akquinet AG</a:t>
             </a:r>
             <a:endParaRPr lang="de-DE" dirty="0"/>
           </a:p>
@@ -9257,7 +9600,7 @@
             <a:fld id="{98405E6C-AB5C-49C6-8300-E0D31946C0F1}" type="datetime1">
               <a:rPr lang="de-DE" smtClean="0"/>
               <a:pPr/>
-              <a:t>03.04.2011</a:t>
+              <a:t>04.04.2011</a:t>
             </a:fld>
             <a:endParaRPr lang="de-DE"/>
           </a:p>
@@ -9279,8 +9622,16 @@
           <a:lstStyle/>
           <a:p>
             <a:r>
-              <a:rPr lang="de-DE" smtClean="0"/>
-              <a:t>Copyright © 2010 – akquinet AG</a:t>
+              <a:rPr lang="de-DE" dirty="0" smtClean="0"/>
+              <a:t>Copyright © </a:t>
+            </a:r>
+            <a:r>
+              <a:rPr lang="de-DE" dirty="0" smtClean="0"/>
+              <a:t>2011 </a:t>
+            </a:r>
+            <a:r>
+              <a:rPr lang="de-DE" dirty="0" smtClean="0"/>
+              <a:t>– akquinet AG</a:t>
             </a:r>
             <a:endParaRPr lang="de-DE" dirty="0"/>
           </a:p>
@@ -10127,7 +10478,7 @@
             <a:fld id="{98405E6C-AB5C-49C6-8300-E0D31946C0F1}" type="datetime1">
               <a:rPr lang="de-DE" smtClean="0"/>
               <a:pPr/>
-              <a:t>03.04.2011</a:t>
+              <a:t>04.04.2011</a:t>
             </a:fld>
             <a:endParaRPr lang="de-DE"/>
           </a:p>
@@ -10149,8 +10500,16 @@
           <a:lstStyle/>
           <a:p>
             <a:r>
-              <a:rPr lang="de-DE" smtClean="0"/>
-              <a:t>Copyright © 2010 – akquinet AG</a:t>
+              <a:rPr lang="de-DE" dirty="0" smtClean="0"/>
+              <a:t>Copyright © </a:t>
+            </a:r>
+            <a:r>
+              <a:rPr lang="de-DE" dirty="0" smtClean="0"/>
+              <a:t>2011 </a:t>
+            </a:r>
+            <a:r>
+              <a:rPr lang="de-DE" dirty="0" smtClean="0"/>
+              <a:t>– akquinet AG</a:t>
             </a:r>
             <a:endParaRPr lang="de-DE" dirty="0"/>
           </a:p>
@@ -12268,6 +12627,289 @@
 </a:theme>
 </file>
 
+<file path=ppt/theme/theme3.xml><?xml version="1.0" encoding="utf-8"?>
+<a:theme xmlns:a="http://schemas.openxmlformats.org/drawingml/2006/main" name="Larissa-Design">
+  <a:themeElements>
+    <a:clrScheme name="Larissa">
+      <a:dk1>
+        <a:sysClr val="windowText" lastClr="000000"/>
+      </a:dk1>
+      <a:lt1>
+        <a:sysClr val="window" lastClr="FFFFFF"/>
+      </a:lt1>
+      <a:dk2>
+        <a:srgbClr val="1F497D"/>
+      </a:dk2>
+      <a:lt2>
+        <a:srgbClr val="EEECE1"/>
+      </a:lt2>
+      <a:accent1>
+        <a:srgbClr val="4F81BD"/>
+      </a:accent1>
+      <a:accent2>
+        <a:srgbClr val="C0504D"/>
+      </a:accent2>
+      <a:accent3>
+        <a:srgbClr val="9BBB59"/>
+      </a:accent3>
+      <a:accent4>
+        <a:srgbClr val="8064A2"/>
+      </a:accent4>
+      <a:accent5>
+        <a:srgbClr val="4BACC6"/>
+      </a:accent5>
+      <a:accent6>
+        <a:srgbClr val="F79646"/>
+      </a:accent6>
+      <a:hlink>
+        <a:srgbClr val="0000FF"/>
+      </a:hlink>
+      <a:folHlink>
+        <a:srgbClr val="800080"/>
+      </a:folHlink>
+    </a:clrScheme>
+    <a:fontScheme name="Larissa">
+      <a:majorFont>
+        <a:latin typeface="Calibri"/>
+        <a:ea typeface=""/>
+        <a:cs typeface=""/>
+        <a:font script="Jpan" typeface="ＭＳ Ｐゴシック"/>
+        <a:font script="Hang" typeface="맑은 고딕"/>
+        <a:font script="Hans" typeface="宋体"/>
+        <a:font script="Hant" typeface="新細明體"/>
+        <a:font script="Arab" typeface="Times New Roman"/>
+        <a:font script="Hebr" typeface="Times New Roman"/>
+        <a:font script="Thai" typeface="Angsana New"/>
+        <a:font script="Ethi" typeface="Nyala"/>
+        <a:font script="Beng" typeface="Vrinda"/>
+        <a:font script="Gujr" typeface="Shruti"/>
+        <a:font script="Khmr" typeface="MoolBoran"/>
+        <a:font script="Knda" typeface="Tunga"/>
+        <a:font script="Guru" typeface="Raavi"/>
+        <a:font script="Cans" typeface="Euphemia"/>
+        <a:font script="Cher" typeface="Plantagenet Cherokee"/>
+        <a:font script="Yiii" typeface="Microsoft Yi Baiti"/>
+        <a:font script="Tibt" typeface="Microsoft Himalaya"/>
+        <a:font script="Thaa" typeface="MV Boli"/>
+        <a:font script="Deva" typeface="Mangal"/>
+        <a:font script="Telu" typeface="Gautami"/>
+        <a:font script="Taml" typeface="Latha"/>
+        <a:font script="Syrc" typeface="Estrangelo Edessa"/>
+        <a:font script="Orya" typeface="Kalinga"/>
+        <a:font script="Mlym" typeface="Kartika"/>
+        <a:font script="Laoo" typeface="DokChampa"/>
+        <a:font script="Sinh" typeface="Iskoola Pota"/>
+        <a:font script="Mong" typeface="Mongolian Baiti"/>
+        <a:font script="Viet" typeface="Times New Roman"/>
+        <a:font script="Uigh" typeface="Microsoft Uighur"/>
+      </a:majorFont>
+      <a:minorFont>
+        <a:latin typeface="Calibri"/>
+        <a:ea typeface=""/>
+        <a:cs typeface=""/>
+        <a:font script="Jpan" typeface="ＭＳ Ｐゴシック"/>
+        <a:font script="Hang" typeface="맑은 고딕"/>
+        <a:font script="Hans" typeface="宋体"/>
+        <a:font script="Hant" typeface="新細明體"/>
+        <a:font script="Arab" typeface="Arial"/>
+        <a:font script="Hebr" typeface="Arial"/>
+        <a:font script="Thai" typeface="Cordia New"/>
+        <a:font script="Ethi" typeface="Nyala"/>
+        <a:font script="Beng" typeface="Vrinda"/>
+        <a:font script="Gujr" typeface="Shruti"/>
+        <a:font script="Khmr" typeface="DaunPenh"/>
+        <a:font script="Knda" typeface="Tunga"/>
+        <a:font script="Guru" typeface="Raavi"/>
+        <a:font script="Cans" typeface="Euphemia"/>
+        <a:font script="Cher" typeface="Plantagenet Cherokee"/>
+        <a:font script="Yiii" typeface="Microsoft Yi Baiti"/>
+        <a:font script="Tibt" typeface="Microsoft Himalaya"/>
+        <a:font script="Thaa" typeface="MV Boli"/>
+        <a:font script="Deva" typeface="Mangal"/>
+        <a:font script="Telu" typeface="Gautami"/>
+        <a:font script="Taml" typeface="Latha"/>
+        <a:font script="Syrc" typeface="Estrangelo Edessa"/>
+        <a:font script="Orya" typeface="Kalinga"/>
+        <a:font script="Mlym" typeface="Kartika"/>
+        <a:font script="Laoo" typeface="DokChampa"/>
+        <a:font script="Sinh" typeface="Iskoola Pota"/>
+        <a:font script="Mong" typeface="Mongolian Baiti"/>
+        <a:font script="Viet" typeface="Arial"/>
+        <a:font script="Uigh" typeface="Microsoft Uighur"/>
+      </a:minorFont>
+    </a:fontScheme>
+    <a:fmtScheme name="Larissa">
+      <a:fillStyleLst>
+        <a:solidFill>
+          <a:schemeClr val="phClr"/>
+        </a:solidFill>
+        <a:gradFill rotWithShape="1">
+          <a:gsLst>
+            <a:gs pos="0">
+              <a:schemeClr val="phClr">
+                <a:tint val="50000"/>
+                <a:satMod val="300000"/>
+              </a:schemeClr>
+            </a:gs>
+            <a:gs pos="35000">
+              <a:schemeClr val="phClr">
+                <a:tint val="37000"/>
+                <a:satMod val="300000"/>
+              </a:schemeClr>
+            </a:gs>
+            <a:gs pos="100000">
+              <a:schemeClr val="phClr">
+                <a:tint val="15000"/>
+                <a:satMod val="350000"/>
+              </a:schemeClr>
+            </a:gs>
+          </a:gsLst>
+          <a:lin ang="16200000" scaled="1"/>
+        </a:gradFill>
+        <a:gradFill rotWithShape="1">
+          <a:gsLst>
+            <a:gs pos="0">
+              <a:schemeClr val="phClr">
+                <a:shade val="51000"/>
+                <a:satMod val="130000"/>
+              </a:schemeClr>
+            </a:gs>
+            <a:gs pos="80000">
+              <a:schemeClr val="phClr">
+                <a:shade val="93000"/>
+                <a:satMod val="130000"/>
+              </a:schemeClr>
+            </a:gs>
+            <a:gs pos="100000">
+              <a:schemeClr val="phClr">
+                <a:shade val="94000"/>
+                <a:satMod val="135000"/>
+              </a:schemeClr>
+            </a:gs>
+          </a:gsLst>
+          <a:lin ang="16200000" scaled="0"/>
+        </a:gradFill>
+      </a:fillStyleLst>
+      <a:lnStyleLst>
+        <a:ln w="9525" cap="flat" cmpd="sng" algn="ctr">
+          <a:solidFill>
+            <a:schemeClr val="phClr">
+              <a:shade val="95000"/>
+              <a:satMod val="105000"/>
+            </a:schemeClr>
+          </a:solidFill>
+          <a:prstDash val="solid"/>
+        </a:ln>
+        <a:ln w="25400" cap="flat" cmpd="sng" algn="ctr">
+          <a:solidFill>
+            <a:schemeClr val="phClr"/>
+          </a:solidFill>
+          <a:prstDash val="solid"/>
+        </a:ln>
+        <a:ln w="38100" cap="flat" cmpd="sng" algn="ctr">
+          <a:solidFill>
+            <a:schemeClr val="phClr"/>
+          </a:solidFill>
+          <a:prstDash val="solid"/>
+        </a:ln>
+      </a:lnStyleLst>
+      <a:effectStyleLst>
+        <a:effectStyle>
+          <a:effectLst>
+            <a:outerShdw blurRad="40000" dist="20000" dir="5400000" rotWithShape="0">
+              <a:srgbClr val="000000">
+                <a:alpha val="38000"/>
+              </a:srgbClr>
+            </a:outerShdw>
+          </a:effectLst>
+        </a:effectStyle>
+        <a:effectStyle>
+          <a:effectLst>
+            <a:outerShdw blurRad="40000" dist="23000" dir="5400000" rotWithShape="0">
+              <a:srgbClr val="000000">
+                <a:alpha val="35000"/>
+              </a:srgbClr>
+            </a:outerShdw>
+          </a:effectLst>
+        </a:effectStyle>
+        <a:effectStyle>
+          <a:effectLst>
+            <a:outerShdw blurRad="40000" dist="23000" dir="5400000" rotWithShape="0">
+              <a:srgbClr val="000000">
+                <a:alpha val="35000"/>
+              </a:srgbClr>
+            </a:outerShdw>
+          </a:effectLst>
+          <a:scene3d>
+            <a:camera prst="orthographicFront">
+              <a:rot lat="0" lon="0" rev="0"/>
+            </a:camera>
+            <a:lightRig rig="threePt" dir="t">
+              <a:rot lat="0" lon="0" rev="1200000"/>
+            </a:lightRig>
+          </a:scene3d>
+          <a:sp3d>
+            <a:bevelT w="63500" h="25400"/>
+          </a:sp3d>
+        </a:effectStyle>
+      </a:effectStyleLst>
+      <a:bgFillStyleLst>
+        <a:solidFill>
+          <a:schemeClr val="phClr"/>
+        </a:solidFill>
+        <a:gradFill rotWithShape="1">
+          <a:gsLst>
+            <a:gs pos="0">
+              <a:schemeClr val="phClr">
+                <a:tint val="40000"/>
+                <a:satMod val="350000"/>
+              </a:schemeClr>
+            </a:gs>
+            <a:gs pos="40000">
+              <a:schemeClr val="phClr">
+                <a:tint val="45000"/>
+                <a:shade val="99000"/>
+                <a:satMod val="350000"/>
+              </a:schemeClr>
+            </a:gs>
+            <a:gs pos="100000">
+              <a:schemeClr val="phClr">
+                <a:shade val="20000"/>
+                <a:satMod val="255000"/>
+              </a:schemeClr>
+            </a:gs>
+          </a:gsLst>
+          <a:path path="circle">
+            <a:fillToRect l="50000" t="-80000" r="50000" b="180000"/>
+          </a:path>
+        </a:gradFill>
+        <a:gradFill rotWithShape="1">
+          <a:gsLst>
+            <a:gs pos="0">
+              <a:schemeClr val="phClr">
+                <a:tint val="80000"/>
+                <a:satMod val="300000"/>
+              </a:schemeClr>
+            </a:gs>
+            <a:gs pos="100000">
+              <a:schemeClr val="phClr">
+                <a:shade val="30000"/>
+                <a:satMod val="200000"/>
+              </a:schemeClr>
+            </a:gs>
+          </a:gsLst>
+          <a:path path="circle">
+            <a:fillToRect l="50000" t="50000" r="50000" b="50000"/>
+          </a:path>
+        </a:gradFill>
+      </a:bgFillStyleLst>
+    </a:fmtScheme>
+  </a:themeElements>
+  <a:objectDefaults/>
+  <a:extraClrSchemeLst/>
+</a:theme>
+</file>
+
 <file path=customXml/item1.xml><?xml version="1.0" encoding="utf-8"?>
 <p:properties xmlns:p="http://schemas.microsoft.com/office/2006/metadata/properties" xmlns:xsi="http://www.w3.org/2001/XMLSchema-instance">
   <documentManagement/>

</xml_diff>